<commit_message>
Update VAST CHALLENGE 2018 MC3-1progress.pptx
commit
</commit_message>
<xml_diff>
--- a/VAST CHALLENGE 2018 MC3-1progress.pptx
+++ b/VAST CHALLENGE 2018 MC3-1progress.pptx
@@ -261,7 +261,7 @@
           <a:p>
             <a:fld id="{CF1A839B-8062-4AF4-A3E4-C732BBF084E5}" type="datetimeFigureOut">
               <a:rPr lang="en-US" smtClean="0"/>
-              <a:t>2/6/2024</a:t>
+              <a:t>5/13/2024</a:t>
             </a:fld>
             <a:endParaRPr lang="en-US"/>
           </a:p>
@@ -431,7 +431,7 @@
           <a:p>
             <a:fld id="{CF1A839B-8062-4AF4-A3E4-C732BBF084E5}" type="datetimeFigureOut">
               <a:rPr lang="en-US" smtClean="0"/>
-              <a:t>2/6/2024</a:t>
+              <a:t>5/13/2024</a:t>
             </a:fld>
             <a:endParaRPr lang="en-US"/>
           </a:p>
@@ -611,7 +611,7 @@
           <a:p>
             <a:fld id="{CF1A839B-8062-4AF4-A3E4-C732BBF084E5}" type="datetimeFigureOut">
               <a:rPr lang="en-US" smtClean="0"/>
-              <a:t>2/6/2024</a:t>
+              <a:t>5/13/2024</a:t>
             </a:fld>
             <a:endParaRPr lang="en-US"/>
           </a:p>
@@ -786,7 +786,7 @@
           <a:p>
             <a:fld id="{CF1A839B-8062-4AF4-A3E4-C732BBF084E5}" type="datetimeFigureOut">
               <a:rPr lang="en-US" smtClean="0"/>
-              <a:t>2/6/2024</a:t>
+              <a:t>5/13/2024</a:t>
             </a:fld>
             <a:endParaRPr lang="en-US"/>
           </a:p>
@@ -956,7 +956,7 @@
           <a:p>
             <a:fld id="{CF1A839B-8062-4AF4-A3E4-C732BBF084E5}" type="datetimeFigureOut">
               <a:rPr lang="en-US" smtClean="0"/>
-              <a:t>2/6/2024</a:t>
+              <a:t>5/13/2024</a:t>
             </a:fld>
             <a:endParaRPr lang="en-US"/>
           </a:p>
@@ -1202,7 +1202,7 @@
           <a:p>
             <a:fld id="{CF1A839B-8062-4AF4-A3E4-C732BBF084E5}" type="datetimeFigureOut">
               <a:rPr lang="en-US" smtClean="0"/>
-              <a:t>2/6/2024</a:t>
+              <a:t>5/13/2024</a:t>
             </a:fld>
             <a:endParaRPr lang="en-US"/>
           </a:p>
@@ -1434,7 +1434,7 @@
           <a:p>
             <a:fld id="{CF1A839B-8062-4AF4-A3E4-C732BBF084E5}" type="datetimeFigureOut">
               <a:rPr lang="en-US" smtClean="0"/>
-              <a:t>2/6/2024</a:t>
+              <a:t>5/13/2024</a:t>
             </a:fld>
             <a:endParaRPr lang="en-US"/>
           </a:p>
@@ -1801,7 +1801,7 @@
           <a:p>
             <a:fld id="{CF1A839B-8062-4AF4-A3E4-C732BBF084E5}" type="datetimeFigureOut">
               <a:rPr lang="en-US" smtClean="0"/>
-              <a:t>2/6/2024</a:t>
+              <a:t>5/13/2024</a:t>
             </a:fld>
             <a:endParaRPr lang="en-US"/>
           </a:p>
@@ -1919,7 +1919,7 @@
           <a:p>
             <a:fld id="{CF1A839B-8062-4AF4-A3E4-C732BBF084E5}" type="datetimeFigureOut">
               <a:rPr lang="en-US" smtClean="0"/>
-              <a:t>2/6/2024</a:t>
+              <a:t>5/13/2024</a:t>
             </a:fld>
             <a:endParaRPr lang="en-US"/>
           </a:p>
@@ -2014,7 +2014,7 @@
           <a:p>
             <a:fld id="{CF1A839B-8062-4AF4-A3E4-C732BBF084E5}" type="datetimeFigureOut">
               <a:rPr lang="en-US" smtClean="0"/>
-              <a:t>2/6/2024</a:t>
+              <a:t>5/13/2024</a:t>
             </a:fld>
             <a:endParaRPr lang="en-US"/>
           </a:p>
@@ -2291,7 +2291,7 @@
           <a:p>
             <a:fld id="{CF1A839B-8062-4AF4-A3E4-C732BBF084E5}" type="datetimeFigureOut">
               <a:rPr lang="en-US" smtClean="0"/>
-              <a:t>2/6/2024</a:t>
+              <a:t>5/13/2024</a:t>
             </a:fld>
             <a:endParaRPr lang="en-US"/>
           </a:p>
@@ -2548,7 +2548,7 @@
           <a:p>
             <a:fld id="{CF1A839B-8062-4AF4-A3E4-C732BBF084E5}" type="datetimeFigureOut">
               <a:rPr lang="en-US" smtClean="0"/>
-              <a:t>2/6/2024</a:t>
+              <a:t>5/13/2024</a:t>
             </a:fld>
             <a:endParaRPr lang="en-US"/>
           </a:p>
@@ -2761,7 +2761,7 @@
           <a:p>
             <a:fld id="{CF1A839B-8062-4AF4-A3E4-C732BBF084E5}" type="datetimeFigureOut">
               <a:rPr lang="en-US" smtClean="0"/>
-              <a:t>2/6/2024</a:t>
+              <a:t>5/13/2024</a:t>
             </a:fld>
             <a:endParaRPr lang="en-US"/>
           </a:p>
@@ -9238,7 +9238,7 @@
             <p:ph idx="1"/>
             <p:extLst>
               <p:ext uri="{D42A27DB-BD31-4B8C-83A1-F6EECF244321}">
-                <p14:modId xmlns:p14="http://schemas.microsoft.com/office/powerpoint/2010/main" val="1907692763"/>
+                <p14:modId xmlns:p14="http://schemas.microsoft.com/office/powerpoint/2010/main" val="3717172320"/>
               </p:ext>
             </p:extLst>
           </p:nvPr>
@@ -9526,7 +9526,7 @@
                     <a:lstStyle/>
                     <a:p>
                       <a:r>
-                        <a:rPr lang="en-US" sz="1200" cap="none" spc="0">
+                        <a:rPr lang="en-US" sz="1200" cap="none" spc="0" dirty="0">
                           <a:solidFill>
                             <a:schemeClr val="tx1">
                               <a:lumMod val="75000"/>
@@ -9534,8 +9534,27 @@
                             </a:schemeClr>
                           </a:solidFill>
                         </a:rPr>
-                        <a:t>Chandra Prem Putheti</a:t>
+                        <a:t>Chandra Prem </a:t>
                       </a:r>
+                      <a:r>
+                        <a:rPr lang="en-US" sz="1200" cap="none" spc="0" dirty="0" err="1">
+                          <a:solidFill>
+                            <a:schemeClr val="tx1">
+                              <a:lumMod val="75000"/>
+                              <a:lumOff val="25000"/>
+                            </a:schemeClr>
+                          </a:solidFill>
+                        </a:rPr>
+                        <a:t>Putheti</a:t>
+                      </a:r>
+                      <a:endParaRPr lang="en-US" sz="1200" cap="none" spc="0" dirty="0">
+                        <a:solidFill>
+                          <a:schemeClr val="tx1">
+                            <a:lumMod val="75000"/>
+                            <a:lumOff val="25000"/>
+                          </a:schemeClr>
+                        </a:solidFill>
+                      </a:endParaRPr>
                     </a:p>
                   </a:txBody>
                   <a:tcPr marL="126333" marR="94750" marT="63167" marB="63167">
@@ -9720,7 +9739,7 @@
                             </a:schemeClr>
                           </a:solidFill>
                         </a:rPr>
-                        <a:t>Renuka </a:t>
+                        <a:t>Aravind </a:t>
                       </a:r>
                       <a:r>
                         <a:rPr lang="en-US" sz="1200" cap="none" spc="0" dirty="0" err="1">
@@ -9731,7 +9750,7 @@
                             </a:schemeClr>
                           </a:solidFill>
                         </a:rPr>
-                        <a:t>Jatoth</a:t>
+                        <a:t>Battula</a:t>
                       </a:r>
                       <a:endParaRPr lang="en-US" sz="1200" cap="none" spc="0" dirty="0">
                         <a:solidFill>
@@ -9897,7 +9916,7 @@
                             </a:schemeClr>
                           </a:solidFill>
                         </a:rPr>
-                        <a:t>NagaSindhura Vadla</a:t>
+                        <a:t>Praveen Reddy</a:t>
                       </a:r>
                     </a:p>
                   </a:txBody>

</xml_diff>